<commit_message>
Deploying to gh-pages from @ plant2go/design@5bf866280f3a1da2cb9fdca98d032f4a834c5e7c 🚀
</commit_message>
<xml_diff>
--- a/praesentation/Plant2Go_Presentation_07112024.pptx
+++ b/praesentation/Plant2Go_Presentation_07112024.pptx
@@ -9,24 +9,25 @@
     <p:sldId id="257" r:id="rId3"/>
     <p:sldId id="258" r:id="rId4"/>
     <p:sldId id="259" r:id="rId5"/>
-    <p:sldId id="260" r:id="rId6"/>
-    <p:sldId id="261" r:id="rId7"/>
-    <p:sldId id="262" r:id="rId8"/>
+    <p:sldId id="263" r:id="rId6"/>
+    <p:sldId id="260" r:id="rId7"/>
+    <p:sldId id="261" r:id="rId8"/>
+    <p:sldId id="262" r:id="rId9"/>
   </p:sldIdLst>
   <p:sldSz cx="18288000" cy="10287000"/>
   <p:notesSz cx="6858000" cy="9144000"/>
   <p:embeddedFontLst>
     <p:embeddedFont>
       <p:font typeface="League Spartan" panose="020B0604020202020204" charset="0"/>
-      <p:regular r:id="rId9"/>
+      <p:regular r:id="rId10"/>
     </p:embeddedFont>
     <p:embeddedFont>
       <p:font typeface="Quicksand" panose="020B0604020202020204" charset="0"/>
-      <p:regular r:id="rId10"/>
+      <p:regular r:id="rId11"/>
     </p:embeddedFont>
     <p:embeddedFont>
       <p:font typeface="Quicksand Bold" panose="020B0604020202020204" charset="0"/>
-      <p:regular r:id="rId11"/>
+      <p:regular r:id="rId12"/>
     </p:embeddedFont>
   </p:embeddedFontLst>
   <p:defaultTextStyle>
@@ -3063,7 +3064,7 @@
     <p:bg>
       <p:bgPr>
         <a:solidFill>
-          <a:srgbClr val="F8F8F8"/>
+          <a:schemeClr val="bg1"/>
         </a:solidFill>
         <a:effectLst/>
       </p:bgPr>
@@ -3572,8 +3573,8 @@
         </p:blipFill>
         <p:spPr>
           <a:xfrm>
-            <a:off x="1139793" y="1025689"/>
-            <a:ext cx="2670208" cy="2670208"/>
+            <a:off x="533400" y="357771"/>
+            <a:ext cx="2968853" cy="2968853"/>
           </a:xfrm>
           <a:prstGeom prst="rect">
             <a:avLst/>
@@ -3654,7 +3655,7 @@
                 </a:lnSpc>
               </a:pPr>
               <a:r>
-                <a:rPr lang="en-US" sz="2499" dirty="0" err="1">
+                <a:rPr lang="de-AT" sz="2499" dirty="0">
                   <a:solidFill>
                     <a:srgbClr val="0A2803"/>
                   </a:solidFill>
@@ -3665,15 +3666,6 @@
                 </a:rPr>
                 <a:t>Projekt-Einführung</a:t>
               </a:r>
-              <a:endParaRPr lang="en-US" sz="2499" dirty="0">
-                <a:solidFill>
-                  <a:srgbClr val="0A2803"/>
-                </a:solidFill>
-                <a:latin typeface="Quicksand"/>
-                <a:ea typeface="Quicksand"/>
-                <a:cs typeface="Quicksand"/>
-                <a:sym typeface="Quicksand"/>
-              </a:endParaRPr>
             </a:p>
             <a:p>
               <a:pPr algn="ctr">
@@ -3739,7 +3731,7 @@
                 </a:lnSpc>
               </a:pPr>
               <a:r>
-                <a:rPr lang="en-US" sz="2499" dirty="0">
+                <a:rPr lang="de-AT" sz="2499" dirty="0">
                   <a:solidFill>
                     <a:srgbClr val="0A2803"/>
                   </a:solidFill>
@@ -3748,29 +3740,8 @@
                   <a:cs typeface="Quicksand"/>
                   <a:sym typeface="Quicksand"/>
                 </a:rPr>
-                <a:t>W-</a:t>
+                <a:t>W-Fragen</a:t>
               </a:r>
-              <a:r>
-                <a:rPr lang="en-US" sz="2499" dirty="0" err="1">
-                  <a:solidFill>
-                    <a:srgbClr val="0A2803"/>
-                  </a:solidFill>
-                  <a:latin typeface="Quicksand"/>
-                  <a:ea typeface="Quicksand"/>
-                  <a:cs typeface="Quicksand"/>
-                  <a:sym typeface="Quicksand"/>
-                </a:rPr>
-                <a:t>Fragen</a:t>
-              </a:r>
-              <a:endParaRPr lang="en-US" sz="2499" dirty="0">
-                <a:solidFill>
-                  <a:srgbClr val="0A2803"/>
-                </a:solidFill>
-                <a:latin typeface="Quicksand"/>
-                <a:ea typeface="Quicksand"/>
-                <a:cs typeface="Quicksand"/>
-                <a:sym typeface="Quicksand"/>
-              </a:endParaRPr>
             </a:p>
           </p:txBody>
         </p:sp>
@@ -4420,10 +4391,12 @@
             </a:bodyPr>
             <a:lstStyle/>
             <a:p>
-              <a:pPr algn="l">
+              <a:pPr marL="342900" indent="-342900" algn="l">
                 <a:lnSpc>
                   <a:spcPts val="4079"/>
                 </a:lnSpc>
+                <a:buFont typeface="Arial" panose="020B0604020202020204" pitchFamily="34" charset="0"/>
+                <a:buChar char="•"/>
               </a:pPr>
               <a:r>
                 <a:rPr lang="en-US" sz="2400" dirty="0">
@@ -4484,10 +4457,12 @@
               </a:endParaRPr>
             </a:p>
             <a:p>
-              <a:pPr algn="l">
+              <a:pPr marL="342900" indent="-342900" algn="l">
                 <a:lnSpc>
                   <a:spcPts val="4079"/>
                 </a:lnSpc>
+                <a:buFont typeface="Arial" panose="020B0604020202020204" pitchFamily="34" charset="0"/>
+                <a:buChar char="•"/>
               </a:pPr>
               <a:r>
                 <a:rPr lang="en-US" sz="2400" dirty="0" err="1">
@@ -4536,10 +4511,12 @@
               </a:endParaRPr>
             </a:p>
             <a:p>
-              <a:pPr algn="l">
+              <a:pPr marL="342900" indent="-342900" algn="l">
                 <a:lnSpc>
                   <a:spcPts val="4079"/>
                 </a:lnSpc>
+                <a:buFont typeface="Arial" panose="020B0604020202020204" pitchFamily="34" charset="0"/>
+                <a:buChar char="•"/>
               </a:pPr>
               <a:r>
                 <a:rPr lang="en-US" sz="2400" dirty="0" err="1">
@@ -4636,10 +4613,12 @@
               </a:endParaRPr>
             </a:p>
             <a:p>
-              <a:pPr algn="l">
+              <a:pPr marL="342900" indent="-342900" algn="l">
                 <a:lnSpc>
                   <a:spcPts val="4079"/>
                 </a:lnSpc>
+                <a:buFont typeface="Arial" panose="020B0604020202020204" pitchFamily="34" charset="0"/>
+                <a:buChar char="•"/>
               </a:pPr>
               <a:r>
                 <a:rPr lang="en-US" sz="2400" dirty="0">
@@ -5080,7 +5059,7 @@
                 </a:lnSpc>
               </a:pPr>
               <a:r>
-                <a:rPr lang="en-US" sz="2400" dirty="0" err="1">
+                <a:rPr lang="de-AT" sz="2400" dirty="0">
                   <a:solidFill>
                     <a:srgbClr val="04202E"/>
                   </a:solidFill>
@@ -5091,15 +5070,6 @@
                 </a:rPr>
                 <a:t>Lernmöglichkeiten</a:t>
               </a:r>
-              <a:endParaRPr lang="en-US" sz="2400" dirty="0">
-                <a:solidFill>
-                  <a:srgbClr val="04202E"/>
-                </a:solidFill>
-                <a:latin typeface="Quicksand"/>
-                <a:ea typeface="Quicksand"/>
-                <a:cs typeface="Quicksand"/>
-                <a:sym typeface="Quicksand"/>
-              </a:endParaRPr>
             </a:p>
             <a:p>
               <a:pPr algn="r">
@@ -5120,7 +5090,7 @@
                 <a:t>DIY </a:t>
               </a:r>
               <a:r>
-                <a:rPr lang="en-US" sz="2400" dirty="0" err="1">
+                <a:rPr lang="de-AT" sz="2400" dirty="0">
                   <a:solidFill>
                     <a:srgbClr val="04202E"/>
                   </a:solidFill>
@@ -5131,15 +5101,6 @@
                 </a:rPr>
                 <a:t>Projekte</a:t>
               </a:r>
-              <a:endParaRPr lang="en-US" sz="2400" dirty="0">
-                <a:solidFill>
-                  <a:srgbClr val="04202E"/>
-                </a:solidFill>
-                <a:latin typeface="Quicksand"/>
-                <a:ea typeface="Quicksand"/>
-                <a:cs typeface="Quicksand"/>
-                <a:sym typeface="Quicksand"/>
-              </a:endParaRPr>
             </a:p>
             <a:p>
               <a:pPr marL="0" lvl="0" indent="0" algn="r">
@@ -5216,7 +5177,7 @@
                   <a:cs typeface="Quicksand Bold"/>
                   <a:sym typeface="Quicksand Bold"/>
                 </a:rPr>
-                <a:t>Jungfamilie</a:t>
+                <a:t>Jungfamilien</a:t>
               </a:r>
               <a:endParaRPr lang="en-US" sz="2799" b="1" dirty="0">
                 <a:solidFill>
@@ -5383,29 +5344,8 @@
                   <a:cs typeface="Quicksand"/>
                   <a:sym typeface="Quicksand"/>
                 </a:rPr>
-                <a:t> </a:t>
+                <a:t> Transport</a:t>
               </a:r>
-              <a:r>
-                <a:rPr lang="en-US" sz="2400" dirty="0" err="1">
-                  <a:solidFill>
-                    <a:srgbClr val="04202E"/>
-                  </a:solidFill>
-                  <a:latin typeface="Quicksand"/>
-                  <a:ea typeface="Quicksand"/>
-                  <a:cs typeface="Quicksand"/>
-                  <a:sym typeface="Quicksand"/>
-                </a:rPr>
-                <a:t>Trasport</a:t>
-              </a:r>
-              <a:endParaRPr lang="en-US" sz="2400" dirty="0">
-                <a:solidFill>
-                  <a:srgbClr val="04202E"/>
-                </a:solidFill>
-                <a:latin typeface="Quicksand"/>
-                <a:ea typeface="Quicksand"/>
-                <a:cs typeface="Quicksand"/>
-                <a:sym typeface="Quicksand"/>
-              </a:endParaRPr>
             </a:p>
             <a:p>
               <a:pPr marL="0" lvl="0" indent="0" algn="l">
@@ -6052,6 +5992,766 @@
 <file path=ppt/slides/slide5.xml><?xml version="1.0" encoding="utf-8"?>
 <p:sld xmlns:a="http://schemas.openxmlformats.org/drawingml/2006/main" xmlns:r="http://schemas.openxmlformats.org/officeDocument/2006/relationships" xmlns:p="http://schemas.openxmlformats.org/presentationml/2006/main">
   <p:cSld>
+    <p:spTree>
+      <p:nvGrpSpPr>
+        <p:cNvPr id="1" name=""/>
+        <p:cNvGrpSpPr/>
+        <p:nvPr/>
+      </p:nvGrpSpPr>
+      <p:grpSpPr>
+        <a:xfrm>
+          <a:off x="0" y="0"/>
+          <a:ext cx="0" cy="0"/>
+          <a:chOff x="0" y="0"/>
+          <a:chExt cx="0" cy="0"/>
+        </a:xfrm>
+      </p:grpSpPr>
+      <p:grpSp>
+        <p:nvGrpSpPr>
+          <p:cNvPr id="2" name="Group 2"/>
+          <p:cNvGrpSpPr/>
+          <p:nvPr/>
+        </p:nvGrpSpPr>
+        <p:grpSpPr>
+          <a:xfrm>
+            <a:off x="14093893" y="7924"/>
+            <a:ext cx="4194107" cy="10271151"/>
+            <a:chOff x="0" y="0"/>
+            <a:chExt cx="1104621" cy="2705159"/>
+          </a:xfrm>
+        </p:grpSpPr>
+        <p:sp>
+          <p:nvSpPr>
+            <p:cNvPr id="3" name="Freeform 3"/>
+            <p:cNvSpPr/>
+            <p:nvPr/>
+          </p:nvSpPr>
+          <p:spPr>
+            <a:xfrm>
+              <a:off x="0" y="0"/>
+              <a:ext cx="1104621" cy="2705159"/>
+            </a:xfrm>
+            <a:custGeom>
+              <a:avLst/>
+              <a:gdLst/>
+              <a:ahLst/>
+              <a:cxnLst/>
+              <a:rect l="l" t="t" r="r" b="b"/>
+              <a:pathLst>
+                <a:path w="1104621" h="2705159">
+                  <a:moveTo>
+                    <a:pt x="0" y="0"/>
+                  </a:moveTo>
+                  <a:lnTo>
+                    <a:pt x="1104621" y="0"/>
+                  </a:lnTo>
+                  <a:lnTo>
+                    <a:pt x="1104621" y="2705159"/>
+                  </a:lnTo>
+                  <a:lnTo>
+                    <a:pt x="0" y="2705159"/>
+                  </a:lnTo>
+                  <a:close/>
+                </a:path>
+              </a:pathLst>
+            </a:custGeom>
+            <a:solidFill>
+              <a:srgbClr val="F2DEE3"/>
+            </a:solidFill>
+          </p:spPr>
+          <p:txBody>
+            <a:bodyPr/>
+            <a:lstStyle/>
+            <a:p>
+              <a:endParaRPr lang="de-AT"/>
+            </a:p>
+          </p:txBody>
+        </p:sp>
+        <p:sp>
+          <p:nvSpPr>
+            <p:cNvPr id="4" name="TextBox 4"/>
+            <p:cNvSpPr txBox="1"/>
+            <p:nvPr/>
+          </p:nvSpPr>
+          <p:spPr>
+            <a:xfrm>
+              <a:off x="0" y="-47625"/>
+              <a:ext cx="1104621" cy="2752784"/>
+            </a:xfrm>
+            <a:prstGeom prst="rect">
+              <a:avLst/>
+            </a:prstGeom>
+          </p:spPr>
+          <p:txBody>
+            <a:bodyPr lIns="50800" tIns="50800" rIns="50800" bIns="50800" rtlCol="0" anchor="ctr"/>
+            <a:lstStyle/>
+            <a:p>
+              <a:pPr algn="ctr">
+                <a:lnSpc>
+                  <a:spcPts val="3693"/>
+                </a:lnSpc>
+              </a:pPr>
+              <a:endParaRPr/>
+            </a:p>
+          </p:txBody>
+        </p:sp>
+      </p:grpSp>
+      <p:sp>
+        <p:nvSpPr>
+          <p:cNvPr id="7" name="Freeform 7"/>
+          <p:cNvSpPr/>
+          <p:nvPr/>
+        </p:nvSpPr>
+        <p:spPr>
+          <a:xfrm>
+            <a:off x="1028700" y="8974931"/>
+            <a:ext cx="1905000" cy="283369"/>
+          </a:xfrm>
+          <a:custGeom>
+            <a:avLst/>
+            <a:gdLst/>
+            <a:ahLst/>
+            <a:cxnLst/>
+            <a:rect l="l" t="t" r="r" b="b"/>
+            <a:pathLst>
+              <a:path w="1905000" h="283369">
+                <a:moveTo>
+                  <a:pt x="0" y="0"/>
+                </a:moveTo>
+                <a:lnTo>
+                  <a:pt x="1905000" y="0"/>
+                </a:lnTo>
+                <a:lnTo>
+                  <a:pt x="1905000" y="283369"/>
+                </a:lnTo>
+                <a:lnTo>
+                  <a:pt x="0" y="283369"/>
+                </a:lnTo>
+                <a:lnTo>
+                  <a:pt x="0" y="0"/>
+                </a:lnTo>
+                <a:close/>
+              </a:path>
+            </a:pathLst>
+          </a:custGeom>
+          <a:blipFill>
+            <a:blip r:embed="rId2">
+              <a:extLst>
+                <a:ext uri="{96DAC541-7B7A-43D3-8B79-37D633B846F1}">
+                  <asvg:svgBlip xmlns:asvg="http://schemas.microsoft.com/office/drawing/2016/SVG/main" r:embed="rId3"/>
+                </a:ext>
+              </a:extLst>
+            </a:blip>
+            <a:stretch>
+              <a:fillRect/>
+            </a:stretch>
+          </a:blipFill>
+        </p:spPr>
+        <p:txBody>
+          <a:bodyPr/>
+          <a:lstStyle/>
+          <a:p>
+            <a:endParaRPr lang="de-AT"/>
+          </a:p>
+        </p:txBody>
+      </p:sp>
+      <p:sp>
+        <p:nvSpPr>
+          <p:cNvPr id="8" name="TextBox 8"/>
+          <p:cNvSpPr txBox="1"/>
+          <p:nvPr/>
+        </p:nvSpPr>
+        <p:spPr>
+          <a:xfrm>
+            <a:off x="609600" y="1001486"/>
+            <a:ext cx="9390243" cy="1111843"/>
+          </a:xfrm>
+          <a:prstGeom prst="rect">
+            <a:avLst/>
+          </a:prstGeom>
+        </p:spPr>
+        <p:txBody>
+          <a:bodyPr lIns="0" tIns="0" rIns="0" bIns="0" rtlCol="0" anchor="t">
+            <a:spAutoFit/>
+          </a:bodyPr>
+          <a:lstStyle/>
+          <a:p>
+            <a:pPr marL="0" lvl="0" indent="0" algn="l">
+              <a:lnSpc>
+                <a:spcPts val="8959"/>
+              </a:lnSpc>
+              <a:spcBef>
+                <a:spcPct val="0"/>
+              </a:spcBef>
+            </a:pPr>
+            <a:r>
+              <a:rPr lang="en-US" sz="6399" dirty="0">
+                <a:solidFill>
+                  <a:srgbClr val="D55672"/>
+                </a:solidFill>
+                <a:latin typeface="League Spartan"/>
+                <a:ea typeface="League Spartan"/>
+                <a:cs typeface="League Spartan"/>
+                <a:sym typeface="League Spartan"/>
+              </a:rPr>
+              <a:t>Service Flip</a:t>
+            </a:r>
+          </a:p>
+        </p:txBody>
+      </p:sp>
+      <p:sp>
+        <p:nvSpPr>
+          <p:cNvPr id="14" name="Freeform 5">
+            <a:extLst>
+              <a:ext uri="{FF2B5EF4-FFF2-40B4-BE49-F238E27FC236}">
+                <a16:creationId xmlns:a16="http://schemas.microsoft.com/office/drawing/2014/main" id="{E5C1AF9C-1CB6-5B46-D146-5A7060EBA6C0}"/>
+              </a:ext>
+            </a:extLst>
+          </p:cNvPr>
+          <p:cNvSpPr/>
+          <p:nvPr/>
+        </p:nvSpPr>
+        <p:spPr>
+          <a:xfrm rot="8619536">
+            <a:off x="4682612" y="2005407"/>
+            <a:ext cx="1189320" cy="632228"/>
+          </a:xfrm>
+          <a:custGeom>
+            <a:avLst/>
+            <a:gdLst/>
+            <a:ahLst/>
+            <a:cxnLst/>
+            <a:rect l="l" t="t" r="r" b="b"/>
+            <a:pathLst>
+              <a:path w="3553493" h="1722267">
+                <a:moveTo>
+                  <a:pt x="0" y="0"/>
+                </a:moveTo>
+                <a:lnTo>
+                  <a:pt x="3553493" y="0"/>
+                </a:lnTo>
+                <a:lnTo>
+                  <a:pt x="3553493" y="1722266"/>
+                </a:lnTo>
+                <a:lnTo>
+                  <a:pt x="0" y="1722266"/>
+                </a:lnTo>
+                <a:lnTo>
+                  <a:pt x="0" y="0"/>
+                </a:lnTo>
+                <a:close/>
+              </a:path>
+            </a:pathLst>
+          </a:custGeom>
+          <a:blipFill>
+            <a:blip r:embed="rId4">
+              <a:extLst>
+                <a:ext uri="{96DAC541-7B7A-43D3-8B79-37D633B846F1}">
+                  <asvg:svgBlip xmlns:asvg="http://schemas.microsoft.com/office/drawing/2016/SVG/main" r:embed="rId5"/>
+                </a:ext>
+              </a:extLst>
+            </a:blip>
+            <a:stretch>
+              <a:fillRect/>
+            </a:stretch>
+          </a:blipFill>
+        </p:spPr>
+        <p:txBody>
+          <a:bodyPr/>
+          <a:lstStyle/>
+          <a:p>
+            <a:endParaRPr lang="de-AT"/>
+          </a:p>
+        </p:txBody>
+      </p:sp>
+      <p:sp>
+        <p:nvSpPr>
+          <p:cNvPr id="5" name="Rechteck 4">
+            <a:extLst>
+              <a:ext uri="{FF2B5EF4-FFF2-40B4-BE49-F238E27FC236}">
+                <a16:creationId xmlns:a16="http://schemas.microsoft.com/office/drawing/2014/main" id="{12049AFE-A2E7-282A-9243-D6F7B96332AE}"/>
+              </a:ext>
+            </a:extLst>
+          </p:cNvPr>
+          <p:cNvSpPr/>
+          <p:nvPr/>
+        </p:nvSpPr>
+        <p:spPr>
+          <a:xfrm>
+            <a:off x="304800" y="2642989"/>
+            <a:ext cx="3429000" cy="5638800"/>
+          </a:xfrm>
+          <a:prstGeom prst="rect">
+            <a:avLst/>
+          </a:prstGeom>
+          <a:solidFill>
+            <a:srgbClr val="F2DEE3"/>
+          </a:solidFill>
+          <a:ln>
+            <a:solidFill>
+              <a:srgbClr val="00B050"/>
+            </a:solidFill>
+            <a:prstDash val="sysDash"/>
+          </a:ln>
+        </p:spPr>
+        <p:style>
+          <a:lnRef idx="2">
+            <a:schemeClr val="accent1">
+              <a:shade val="15000"/>
+            </a:schemeClr>
+          </a:lnRef>
+          <a:fillRef idx="1">
+            <a:schemeClr val="accent1"/>
+          </a:fillRef>
+          <a:effectRef idx="0">
+            <a:schemeClr val="accent1"/>
+          </a:effectRef>
+          <a:fontRef idx="minor">
+            <a:schemeClr val="lt1"/>
+          </a:fontRef>
+        </p:style>
+        <p:txBody>
+          <a:bodyPr rtlCol="0" anchor="ctr"/>
+          <a:lstStyle/>
+          <a:p>
+            <a:pPr algn="ctr"/>
+            <a:r>
+              <a:rPr lang="de-AT" b="1" dirty="0">
+                <a:solidFill>
+                  <a:schemeClr val="tx1"/>
+                </a:solidFill>
+              </a:rPr>
+              <a:t>The </a:t>
+            </a:r>
+            <a:r>
+              <a:rPr lang="de-AT" b="1" dirty="0" err="1">
+                <a:solidFill>
+                  <a:schemeClr val="tx1"/>
+                </a:solidFill>
+              </a:rPr>
+              <a:t>Product</a:t>
+            </a:r>
+            <a:endParaRPr lang="de-AT" b="1" dirty="0">
+              <a:solidFill>
+                <a:schemeClr val="tx1"/>
+              </a:solidFill>
+            </a:endParaRPr>
+          </a:p>
+          <a:p>
+            <a:pPr algn="ctr"/>
+            <a:endParaRPr lang="de-AT" b="1" dirty="0">
+              <a:solidFill>
+                <a:schemeClr val="tx1"/>
+              </a:solidFill>
+            </a:endParaRPr>
+          </a:p>
+          <a:p>
+            <a:pPr algn="ctr"/>
+            <a:r>
+              <a:rPr lang="de-DE" dirty="0">
+                <a:solidFill>
+                  <a:sysClr val="windowText" lastClr="000000"/>
+                </a:solidFill>
+              </a:rPr>
+              <a:t>Der Plant2Go Rucksack ist ein innovativer , nachhaltiger Rucksack, der als mobile Pflanzenzuchtstation konzipiert wurde und es ermöglicht, Obst und Gemüse auf kleinstem Raum anzubauen. Durch Upcycling alter Rucksäcke und die Integration umweltfreundlicher Materialien bietet er eine multifunktionale Lösung für umweltbewusste Nutzer, die mobil oder in städtischen Umgebungen gärtnern möchten</a:t>
+            </a:r>
+            <a:endParaRPr lang="de-AT" dirty="0">
+              <a:solidFill>
+                <a:sysClr val="windowText" lastClr="000000"/>
+              </a:solidFill>
+            </a:endParaRPr>
+          </a:p>
+        </p:txBody>
+      </p:sp>
+      <p:sp>
+        <p:nvSpPr>
+          <p:cNvPr id="6" name="Rechteck 5">
+            <a:extLst>
+              <a:ext uri="{FF2B5EF4-FFF2-40B4-BE49-F238E27FC236}">
+                <a16:creationId xmlns:a16="http://schemas.microsoft.com/office/drawing/2014/main" id="{88BCD814-6954-8440-307A-DD9348D9253E}"/>
+              </a:ext>
+            </a:extLst>
+          </p:cNvPr>
+          <p:cNvSpPr/>
+          <p:nvPr/>
+        </p:nvSpPr>
+        <p:spPr>
+          <a:xfrm>
+            <a:off x="3886200" y="3940589"/>
+            <a:ext cx="3429000" cy="5638800"/>
+          </a:xfrm>
+          <a:prstGeom prst="rect">
+            <a:avLst/>
+          </a:prstGeom>
+          <a:solidFill>
+            <a:srgbClr val="F2DEE3"/>
+          </a:solidFill>
+          <a:ln>
+            <a:solidFill>
+              <a:srgbClr val="00B050"/>
+            </a:solidFill>
+            <a:prstDash val="sysDash"/>
+          </a:ln>
+        </p:spPr>
+        <p:style>
+          <a:lnRef idx="2">
+            <a:schemeClr val="accent1">
+              <a:shade val="15000"/>
+            </a:schemeClr>
+          </a:lnRef>
+          <a:fillRef idx="1">
+            <a:schemeClr val="accent1"/>
+          </a:fillRef>
+          <a:effectRef idx="0">
+            <a:schemeClr val="accent1"/>
+          </a:effectRef>
+          <a:fontRef idx="minor">
+            <a:schemeClr val="lt1"/>
+          </a:fontRef>
+        </p:style>
+        <p:txBody>
+          <a:bodyPr rtlCol="0" anchor="ctr"/>
+          <a:lstStyle/>
+          <a:p>
+            <a:pPr algn="ctr"/>
+            <a:r>
+              <a:rPr lang="de-AT" b="1" dirty="0">
+                <a:solidFill>
+                  <a:schemeClr val="tx1"/>
+                </a:solidFill>
+              </a:rPr>
+              <a:t>The </a:t>
+            </a:r>
+            <a:r>
+              <a:rPr lang="de-AT" b="1" dirty="0" err="1">
+                <a:solidFill>
+                  <a:schemeClr val="tx1"/>
+                </a:solidFill>
+              </a:rPr>
+              <a:t>User´s</a:t>
+            </a:r>
+            <a:r>
+              <a:rPr lang="de-AT" b="1" dirty="0">
+                <a:solidFill>
+                  <a:schemeClr val="tx1"/>
+                </a:solidFill>
+              </a:rPr>
+              <a:t> </a:t>
+            </a:r>
+            <a:r>
+              <a:rPr lang="de-AT" b="1" dirty="0" err="1">
+                <a:solidFill>
+                  <a:schemeClr val="tx1"/>
+                </a:solidFill>
+              </a:rPr>
+              <a:t>need</a:t>
+            </a:r>
+            <a:endParaRPr lang="de-AT" b="1" dirty="0">
+              <a:solidFill>
+                <a:schemeClr val="tx1"/>
+              </a:solidFill>
+            </a:endParaRPr>
+          </a:p>
+          <a:p>
+            <a:pPr algn="ctr"/>
+            <a:endParaRPr lang="de-AT" b="1" dirty="0">
+              <a:solidFill>
+                <a:schemeClr val="tx1"/>
+              </a:solidFill>
+            </a:endParaRPr>
+          </a:p>
+          <a:p>
+            <a:pPr algn="ctr"/>
+            <a:r>
+              <a:rPr lang="de-DE" dirty="0">
+                <a:solidFill>
+                  <a:schemeClr val="tx1"/>
+                </a:solidFill>
+              </a:rPr>
+              <a:t>Zugang zu nachhaltigem Pflanzenanbau auf kleinstem Raum, um eine Garten-Erfahrung für Menschen zu ermöglichen, die aufgrund von Platzmangel, städtischem Umfeld oder Mobilitätsbedürfnis keinen festen Garten haben können</a:t>
+            </a:r>
+            <a:endParaRPr lang="de-AT" dirty="0">
+              <a:solidFill>
+                <a:schemeClr val="tx1"/>
+              </a:solidFill>
+            </a:endParaRPr>
+          </a:p>
+        </p:txBody>
+      </p:sp>
+      <p:sp>
+        <p:nvSpPr>
+          <p:cNvPr id="12" name="Rechteck 11">
+            <a:extLst>
+              <a:ext uri="{FF2B5EF4-FFF2-40B4-BE49-F238E27FC236}">
+                <a16:creationId xmlns:a16="http://schemas.microsoft.com/office/drawing/2014/main" id="{CC8C8172-F236-2423-BACA-EEB2D3FA30F1}"/>
+              </a:ext>
+            </a:extLst>
+          </p:cNvPr>
+          <p:cNvSpPr/>
+          <p:nvPr/>
+        </p:nvSpPr>
+        <p:spPr>
+          <a:xfrm>
+            <a:off x="7467600" y="2627749"/>
+            <a:ext cx="3429000" cy="5638800"/>
+          </a:xfrm>
+          <a:prstGeom prst="rect">
+            <a:avLst/>
+          </a:prstGeom>
+          <a:solidFill>
+            <a:srgbClr val="F2DEE3"/>
+          </a:solidFill>
+          <a:ln>
+            <a:solidFill>
+              <a:srgbClr val="00B050"/>
+            </a:solidFill>
+            <a:prstDash val="sysDash"/>
+          </a:ln>
+        </p:spPr>
+        <p:style>
+          <a:lnRef idx="2">
+            <a:schemeClr val="accent1">
+              <a:shade val="15000"/>
+            </a:schemeClr>
+          </a:lnRef>
+          <a:fillRef idx="1">
+            <a:schemeClr val="accent1"/>
+          </a:fillRef>
+          <a:effectRef idx="0">
+            <a:schemeClr val="accent1"/>
+          </a:effectRef>
+          <a:fontRef idx="minor">
+            <a:schemeClr val="lt1"/>
+          </a:fontRef>
+        </p:style>
+        <p:txBody>
+          <a:bodyPr rtlCol="0" anchor="ctr"/>
+          <a:lstStyle/>
+          <a:p>
+            <a:pPr algn="ctr"/>
+            <a:r>
+              <a:rPr lang="en-US" b="1" dirty="0">
+                <a:solidFill>
+                  <a:schemeClr val="tx1"/>
+                </a:solidFill>
+              </a:rPr>
+              <a:t>What are other ways to meet this need beyond owning that product?</a:t>
+            </a:r>
+          </a:p>
+          <a:p>
+            <a:pPr algn="ctr"/>
+            <a:endParaRPr lang="en-US" b="1" dirty="0">
+              <a:solidFill>
+                <a:schemeClr val="tx1"/>
+              </a:solidFill>
+            </a:endParaRPr>
+          </a:p>
+          <a:p>
+            <a:pPr algn="ctr"/>
+            <a:r>
+              <a:rPr lang="de-DE" dirty="0">
+                <a:solidFill>
+                  <a:schemeClr val="tx1"/>
+                </a:solidFill>
+              </a:rPr>
+              <a:t>Gemeinschaftsgarten-Stationen: In Städten oder Gemeinschaftszentren könnten festinstallierte Plant2Go-Rucksäcke als mobile Anbauplätze zur gemeinsamen Nutzung bereitgestellt werden. Workshops und Lernprogramme: Ein integrierter Service, bei dem Nutzer den Rucksack erhalten und gleichzeitig an Workshops teilnehmen, um Kenntnisse im nachhaltigen Anbau und Pflege der Pflanzen zu erwerben. Bildungsarbeit in Schulen, Kindergärten, Einrichtungen</a:t>
+            </a:r>
+            <a:endParaRPr lang="en-US" b="1" dirty="0">
+              <a:solidFill>
+                <a:schemeClr val="tx1"/>
+              </a:solidFill>
+            </a:endParaRPr>
+          </a:p>
+        </p:txBody>
+      </p:sp>
+      <p:sp>
+        <p:nvSpPr>
+          <p:cNvPr id="15" name="Rechteck 14">
+            <a:extLst>
+              <a:ext uri="{FF2B5EF4-FFF2-40B4-BE49-F238E27FC236}">
+                <a16:creationId xmlns:a16="http://schemas.microsoft.com/office/drawing/2014/main" id="{02BD6947-FB17-5D0A-F8DB-465B21F68258}"/>
+              </a:ext>
+            </a:extLst>
+          </p:cNvPr>
+          <p:cNvSpPr/>
+          <p:nvPr/>
+        </p:nvSpPr>
+        <p:spPr>
+          <a:xfrm>
+            <a:off x="11049000" y="3940589"/>
+            <a:ext cx="3429000" cy="5638800"/>
+          </a:xfrm>
+          <a:prstGeom prst="rect">
+            <a:avLst/>
+          </a:prstGeom>
+          <a:solidFill>
+            <a:srgbClr val="F2DEE3"/>
+          </a:solidFill>
+          <a:ln>
+            <a:solidFill>
+              <a:srgbClr val="00B050"/>
+            </a:solidFill>
+            <a:prstDash val="sysDash"/>
+          </a:ln>
+        </p:spPr>
+        <p:style>
+          <a:lnRef idx="2">
+            <a:schemeClr val="accent1">
+              <a:shade val="15000"/>
+            </a:schemeClr>
+          </a:lnRef>
+          <a:fillRef idx="1">
+            <a:schemeClr val="accent1"/>
+          </a:fillRef>
+          <a:effectRef idx="0">
+            <a:schemeClr val="accent1"/>
+          </a:effectRef>
+          <a:fontRef idx="minor">
+            <a:schemeClr val="lt1"/>
+          </a:fontRef>
+        </p:style>
+        <p:txBody>
+          <a:bodyPr rtlCol="0" anchor="ctr"/>
+          <a:lstStyle/>
+          <a:p>
+            <a:pPr algn="ctr"/>
+            <a:r>
+              <a:rPr lang="en-US" b="1" dirty="0">
+                <a:solidFill>
+                  <a:schemeClr val="tx1"/>
+                </a:solidFill>
+              </a:rPr>
+              <a:t>What is the service experience?</a:t>
+            </a:r>
+          </a:p>
+          <a:p>
+            <a:pPr algn="ctr"/>
+            <a:endParaRPr lang="en-US" b="1" dirty="0">
+              <a:solidFill>
+                <a:schemeClr val="tx1"/>
+              </a:solidFill>
+            </a:endParaRPr>
+          </a:p>
+          <a:p>
+            <a:pPr algn="ctr"/>
+            <a:r>
+              <a:rPr lang="de-DE" dirty="0">
+                <a:solidFill>
+                  <a:schemeClr val="tx1"/>
+                </a:solidFill>
+              </a:rPr>
+              <a:t>Flexibler Abonnement Service: Für Saatgut, Wartung, Upgrades Begleitende digitale Plattform: Informationen zu Pflanzenauswahl, Bewässerungstipps und Wachstumsfortschritten integriertes Senioren-System Community Feature: Zum Austausch von Tipps und Erfahrungsberichte zw. den Nutzern</a:t>
+            </a:r>
+            <a:endParaRPr lang="de-AT" dirty="0">
+              <a:solidFill>
+                <a:schemeClr val="tx1"/>
+              </a:solidFill>
+            </a:endParaRPr>
+          </a:p>
+        </p:txBody>
+      </p:sp>
+      <p:sp>
+        <p:nvSpPr>
+          <p:cNvPr id="16" name="Rechteck 15">
+            <a:extLst>
+              <a:ext uri="{FF2B5EF4-FFF2-40B4-BE49-F238E27FC236}">
+                <a16:creationId xmlns:a16="http://schemas.microsoft.com/office/drawing/2014/main" id="{F6A60DEB-BF71-77ED-E1A1-E151D778A728}"/>
+              </a:ext>
+            </a:extLst>
+          </p:cNvPr>
+          <p:cNvSpPr/>
+          <p:nvPr/>
+        </p:nvSpPr>
+        <p:spPr>
+          <a:xfrm>
+            <a:off x="14645640" y="2627749"/>
+            <a:ext cx="3442089" cy="5638800"/>
+          </a:xfrm>
+          <a:prstGeom prst="rect">
+            <a:avLst/>
+          </a:prstGeom>
+          <a:solidFill>
+            <a:srgbClr val="F2DEE3"/>
+          </a:solidFill>
+          <a:ln>
+            <a:solidFill>
+              <a:srgbClr val="00B050"/>
+            </a:solidFill>
+            <a:prstDash val="sysDash"/>
+          </a:ln>
+        </p:spPr>
+        <p:style>
+          <a:lnRef idx="2">
+            <a:schemeClr val="accent1">
+              <a:shade val="15000"/>
+            </a:schemeClr>
+          </a:lnRef>
+          <a:fillRef idx="1">
+            <a:schemeClr val="accent1"/>
+          </a:fillRef>
+          <a:effectRef idx="0">
+            <a:schemeClr val="accent1"/>
+          </a:effectRef>
+          <a:fontRef idx="minor">
+            <a:schemeClr val="lt1"/>
+          </a:fontRef>
+        </p:style>
+        <p:txBody>
+          <a:bodyPr rtlCol="0" anchor="ctr"/>
+          <a:lstStyle/>
+          <a:p>
+            <a:pPr algn="ctr"/>
+            <a:r>
+              <a:rPr lang="en-US" b="1" dirty="0">
+                <a:solidFill>
+                  <a:schemeClr val="tx1"/>
+                </a:solidFill>
+              </a:rPr>
+              <a:t>What systems need to be in place? </a:t>
+            </a:r>
+          </a:p>
+          <a:p>
+            <a:pPr algn="ctr"/>
+            <a:endParaRPr lang="en-US" b="1" dirty="0">
+              <a:solidFill>
+                <a:schemeClr val="tx1"/>
+              </a:solidFill>
+            </a:endParaRPr>
+          </a:p>
+          <a:p>
+            <a:pPr algn="ctr"/>
+            <a:r>
+              <a:rPr lang="de-DE" dirty="0">
+                <a:solidFill>
+                  <a:schemeClr val="tx1"/>
+                </a:solidFill>
+              </a:rPr>
+              <a:t>System: Online-Portal/App für Verwaltung und Tracking des Rucksacks, Information zu Pflanzenwachstum, Pflege sowie Sensorik zur Überwachung der Pflanzengesundheit, Life-Time Service für Reparaturen/Upgrades Partnerschaften: Partnerschaften mit Up/recycling-Betrieben für die Beschaffung alter Rucksäcke, Materialien, Partnerschaften mit Gärtnereibetrieben für Saatgut und Zubehör</a:t>
+            </a:r>
+            <a:endParaRPr lang="de-AT" dirty="0">
+              <a:solidFill>
+                <a:schemeClr val="tx1"/>
+              </a:solidFill>
+            </a:endParaRPr>
+          </a:p>
+        </p:txBody>
+      </p:sp>
+    </p:spTree>
+    <p:extLst>
+      <p:ext uri="{BB962C8B-B14F-4D97-AF65-F5344CB8AC3E}">
+        <p14:creationId xmlns:p14="http://schemas.microsoft.com/office/powerpoint/2010/main" val="663525285"/>
+      </p:ext>
+    </p:extLst>
+  </p:cSld>
+  <p:clrMapOvr>
+    <a:masterClrMapping/>
+  </p:clrMapOvr>
+</p:sld>
+</file>
+
+<file path=ppt/slides/slide6.xml><?xml version="1.0" encoding="utf-8"?>
+<p:sld xmlns:a="http://schemas.openxmlformats.org/drawingml/2006/main" xmlns:r="http://schemas.openxmlformats.org/officeDocument/2006/relationships" xmlns:p="http://schemas.openxmlformats.org/presentationml/2006/main">
+  <p:cSld>
     <p:bg>
       <p:bgPr>
         <a:solidFill>
@@ -6082,10 +6782,10 @@
         </p:nvGrpSpPr>
         <p:grpSpPr>
           <a:xfrm>
-            <a:off x="886761" y="2456695"/>
-            <a:ext cx="5385764" cy="6426664"/>
-            <a:chOff x="0" y="0"/>
-            <a:chExt cx="1418473" cy="1692619"/>
+            <a:off x="925818" y="677679"/>
+            <a:ext cx="5488948" cy="7890311"/>
+            <a:chOff x="-27176" y="-123825"/>
+            <a:chExt cx="1445649" cy="2183687"/>
           </a:xfrm>
         </p:grpSpPr>
         <p:sp>
@@ -6096,7 +6796,7 @@
           </p:nvSpPr>
           <p:spPr>
             <a:xfrm>
-              <a:off x="0" y="0"/>
+              <a:off x="-27176" y="367243"/>
               <a:ext cx="1418473" cy="1692619"/>
             </a:xfrm>
             <a:custGeom>
@@ -6210,8 +6910,8 @@
         </p:nvSpPr>
         <p:spPr>
           <a:xfrm>
-            <a:off x="2405199" y="2877488"/>
-            <a:ext cx="2348889" cy="2348889"/>
+            <a:off x="3273842" y="2555789"/>
+            <a:ext cx="719000" cy="719000"/>
           </a:xfrm>
           <a:custGeom>
             <a:avLst/>
@@ -6269,10 +6969,10 @@
         </p:nvGrpSpPr>
         <p:grpSpPr>
           <a:xfrm>
-            <a:off x="6451118" y="2456695"/>
-            <a:ext cx="5385764" cy="6426664"/>
-            <a:chOff x="0" y="0"/>
-            <a:chExt cx="1418473" cy="1692619"/>
+            <a:off x="6451118" y="1986547"/>
+            <a:ext cx="5385764" cy="7890311"/>
+            <a:chOff x="0" y="-123825"/>
+            <a:chExt cx="1418473" cy="1816444"/>
           </a:xfrm>
         </p:grpSpPr>
         <p:sp>
@@ -6283,7 +6983,7 @@
           </p:nvSpPr>
           <p:spPr>
             <a:xfrm>
-              <a:off x="0" y="0"/>
+              <a:off x="0" y="-11267"/>
               <a:ext cx="1418473" cy="1692619"/>
             </a:xfrm>
             <a:custGeom>
@@ -6397,8 +7097,8 @@
         </p:nvSpPr>
         <p:spPr>
           <a:xfrm>
-            <a:off x="7984503" y="2877488"/>
-            <a:ext cx="2318994" cy="2348889"/>
+            <a:off x="8659742" y="2603274"/>
+            <a:ext cx="764087" cy="711426"/>
           </a:xfrm>
           <a:custGeom>
             <a:avLst/>
@@ -6584,8 +7284,8 @@
         </p:nvSpPr>
         <p:spPr>
           <a:xfrm>
-            <a:off x="13595029" y="3088463"/>
-            <a:ext cx="2226655" cy="2226655"/>
+            <a:off x="14228771" y="2548258"/>
+            <a:ext cx="935030" cy="835837"/>
           </a:xfrm>
           <a:custGeom>
             <a:avLst/>
@@ -6687,10 +7387,10 @@
         </p:nvGrpSpPr>
         <p:grpSpPr>
           <a:xfrm>
-            <a:off x="1028700" y="5619037"/>
-            <a:ext cx="5101887" cy="2490663"/>
-            <a:chOff x="0" y="0"/>
-            <a:chExt cx="6802515" cy="3320884"/>
+            <a:off x="1170638" y="3741800"/>
+            <a:ext cx="5101887" cy="4171487"/>
+            <a:chOff x="0" y="-66675"/>
+            <a:chExt cx="6802515" cy="5561982"/>
           </a:xfrm>
         </p:grpSpPr>
         <p:sp>
@@ -6702,7 +7402,7 @@
           <p:spPr>
             <a:xfrm>
               <a:off x="0" y="657059"/>
-              <a:ext cx="6802515" cy="2663825"/>
+              <a:ext cx="6802515" cy="4838248"/>
             </a:xfrm>
             <a:prstGeom prst="rect">
               <a:avLst/>
@@ -6722,16 +7422,20 @@
                 <a:buChar char="•"/>
               </a:pPr>
               <a:r>
-                <a:rPr lang="en-US" sz="2400" dirty="0">
-                  <a:solidFill>
-                    <a:srgbClr val="0A2803"/>
-                  </a:solidFill>
-                  <a:latin typeface="Quicksand"/>
-                  <a:ea typeface="Quicksand"/>
-                  <a:cs typeface="Quicksand"/>
-                  <a:sym typeface="Quicksand"/>
-                </a:rPr>
-                <a:t>Description</a:t>
+                <a:rPr lang="de-AT" sz="2400" dirty="0" err="1"/>
+                <a:t>Product</a:t>
+              </a:r>
+              <a:r>
+                <a:rPr lang="de-AT" sz="2400" dirty="0"/>
+                <a:t> </a:t>
+              </a:r>
+              <a:r>
+                <a:rPr lang="de-AT" sz="2400" dirty="0" err="1"/>
+                <a:t>as</a:t>
+              </a:r>
+              <a:r>
+                <a:rPr lang="de-AT" sz="2400" dirty="0"/>
+                <a:t> a Service --&gt; Rund um Produkt Service Unabhängigkeit</a:t>
               </a:r>
             </a:p>
             <a:p>
@@ -6743,16 +7447,8 @@
                 <a:buChar char="•"/>
               </a:pPr>
               <a:r>
-                <a:rPr lang="en-US" sz="2400" dirty="0">
-                  <a:solidFill>
-                    <a:srgbClr val="0A2803"/>
-                  </a:solidFill>
-                  <a:latin typeface="Quicksand"/>
-                  <a:ea typeface="Quicksand"/>
-                  <a:cs typeface="Quicksand"/>
-                  <a:sym typeface="Quicksand"/>
-                </a:rPr>
-                <a:t>Description</a:t>
+                <a:rPr lang="de-AT" sz="2400" dirty="0"/>
+                <a:t>(wenig Ressourcen) Ortsunabhängig (indoor, Outdoor, mobil) </a:t>
               </a:r>
             </a:p>
             <a:p>
@@ -6764,16 +7460,8 @@
                 <a:buChar char="•"/>
               </a:pPr>
               <a:r>
-                <a:rPr lang="en-US" sz="2400" dirty="0">
-                  <a:solidFill>
-                    <a:srgbClr val="0A2803"/>
-                  </a:solidFill>
-                  <a:latin typeface="Quicksand"/>
-                  <a:ea typeface="Quicksand"/>
-                  <a:cs typeface="Quicksand"/>
-                  <a:sym typeface="Quicksand"/>
-                </a:rPr>
-                <a:t>Description</a:t>
+                <a:rPr lang="de-AT" sz="2400" dirty="0"/>
+                <a:t>Flexibilität Ästhetik - sieht gut aus,</a:t>
               </a:r>
             </a:p>
             <a:p>
@@ -6785,17 +7473,18 @@
                 <a:buChar char="•"/>
               </a:pPr>
               <a:r>
-                <a:rPr lang="en-US" sz="2400" dirty="0">
-                  <a:solidFill>
-                    <a:srgbClr val="0A2803"/>
-                  </a:solidFill>
-                  <a:latin typeface="Quicksand"/>
-                  <a:ea typeface="Quicksand"/>
-                  <a:cs typeface="Quicksand"/>
-                  <a:sym typeface="Quicksand"/>
-                </a:rPr>
-                <a:t>Description</a:t>
+                <a:rPr lang="de-AT" sz="2400" dirty="0"/>
+                <a:t>innovatives Design Nachhaltig und Umweltbewusst</a:t>
               </a:r>
+              <a:endParaRPr lang="en-US" sz="2400" dirty="0">
+                <a:solidFill>
+                  <a:srgbClr val="0A2803"/>
+                </a:solidFill>
+                <a:latin typeface="Quicksand"/>
+                <a:ea typeface="Quicksand"/>
+                <a:cs typeface="Quicksand"/>
+                <a:sym typeface="Quicksand"/>
+              </a:endParaRPr>
             </a:p>
           </p:txBody>
         </p:sp>
@@ -6820,7 +7509,7 @@
             </a:bodyPr>
             <a:lstStyle/>
             <a:p>
-              <a:pPr marL="0" lvl="0" indent="0" algn="l">
+              <a:pPr marL="0" lvl="0" indent="0" algn="ctr">
                 <a:lnSpc>
                   <a:spcPts val="3919"/>
                 </a:lnSpc>
@@ -6861,10 +7550,10 @@
         </p:nvGrpSpPr>
         <p:grpSpPr>
           <a:xfrm>
-            <a:off x="6593057" y="5637644"/>
-            <a:ext cx="5101887" cy="2980688"/>
-            <a:chOff x="0" y="0"/>
-            <a:chExt cx="6802515" cy="3974251"/>
+            <a:off x="6509132" y="3607883"/>
+            <a:ext cx="5259968" cy="6206602"/>
+            <a:chOff x="-63520" y="-1978078"/>
+            <a:chExt cx="7013290" cy="8275471"/>
           </a:xfrm>
         </p:grpSpPr>
         <p:sp>
@@ -6875,8 +7564,8 @@
           </p:nvSpPr>
           <p:spPr>
             <a:xfrm>
-              <a:off x="0" y="624626"/>
-              <a:ext cx="6802515" cy="3349625"/>
+              <a:off x="-63520" y="-1345043"/>
+              <a:ext cx="6802515" cy="7642436"/>
             </a:xfrm>
             <a:prstGeom prst="rect">
               <a:avLst/>
@@ -6896,16 +7585,8 @@
                 <a:buChar char="•"/>
               </a:pPr>
               <a:r>
-                <a:rPr lang="en-US" sz="2400">
-                  <a:solidFill>
-                    <a:srgbClr val="0A2803"/>
-                  </a:solidFill>
-                  <a:latin typeface="Quicksand"/>
-                  <a:ea typeface="Quicksand"/>
-                  <a:cs typeface="Quicksand"/>
-                  <a:sym typeface="Quicksand"/>
-                </a:rPr>
-                <a:t>Description</a:t>
+                <a:rPr lang="de-DE" sz="2400" dirty="0"/>
+                <a:t>Pflanzenzucht und –pflege</a:t>
               </a:r>
             </a:p>
             <a:p>
@@ -6917,16 +7598,8 @@
                 <a:buChar char="•"/>
               </a:pPr>
               <a:r>
-                <a:rPr lang="en-US" sz="2400">
-                  <a:solidFill>
-                    <a:srgbClr val="0A2803"/>
-                  </a:solidFill>
-                  <a:latin typeface="Quicksand"/>
-                  <a:ea typeface="Quicksand"/>
-                  <a:cs typeface="Quicksand"/>
-                  <a:sym typeface="Quicksand"/>
-                </a:rPr>
-                <a:t>Description</a:t>
+                <a:rPr lang="de-DE" sz="2400" dirty="0"/>
+                <a:t>Pflanzenvielfalt Grüner Daumen</a:t>
               </a:r>
             </a:p>
             <a:p>
@@ -6938,16 +7611,8 @@
                 <a:buChar char="•"/>
               </a:pPr>
               <a:r>
-                <a:rPr lang="en-US" sz="2400">
-                  <a:solidFill>
-                    <a:srgbClr val="0A2803"/>
-                  </a:solidFill>
-                  <a:latin typeface="Quicksand"/>
-                  <a:ea typeface="Quicksand"/>
-                  <a:cs typeface="Quicksand"/>
-                  <a:sym typeface="Quicksand"/>
-                </a:rPr>
-                <a:t>Description</a:t>
+                <a:rPr lang="de-DE" sz="2400" dirty="0"/>
+                <a:t>Unabhängigkeit von Unternehmen</a:t>
               </a:r>
             </a:p>
             <a:p>
@@ -6959,25 +7624,49 @@
                 <a:buChar char="•"/>
               </a:pPr>
               <a:r>
-                <a:rPr lang="en-US" sz="2400">
-                  <a:solidFill>
-                    <a:srgbClr val="0A2803"/>
-                  </a:solidFill>
-                  <a:latin typeface="Quicksand"/>
-                  <a:ea typeface="Quicksand"/>
-                  <a:cs typeface="Quicksand"/>
-                  <a:sym typeface="Quicksand"/>
-                </a:rPr>
-                <a:t>Description</a:t>
+                <a:rPr lang="de-DE" sz="2400" dirty="0"/>
+                <a:t>Selbstversorgeraspekt, keine Pestizide, gesünder und bewusster</a:t>
               </a:r>
             </a:p>
             <a:p>
-              <a:pPr algn="l">
+              <a:pPr marL="518160" lvl="1" indent="-259080" algn="l">
                 <a:lnSpc>
                   <a:spcPts val="4079"/>
                 </a:lnSpc>
+                <a:buFont typeface="Arial"/>
+                <a:buChar char="•"/>
               </a:pPr>
-              <a:endParaRPr lang="en-US" sz="2400">
+              <a:r>
+                <a:rPr lang="de-DE" sz="2400" dirty="0"/>
+                <a:t>Leben Akzeptanz für Bauern</a:t>
+              </a:r>
+            </a:p>
+            <a:p>
+              <a:pPr marL="518160" lvl="1" indent="-259080" algn="l">
+                <a:lnSpc>
+                  <a:spcPts val="4079"/>
+                </a:lnSpc>
+                <a:buFont typeface="Arial"/>
+                <a:buChar char="•"/>
+              </a:pPr>
+              <a:r>
+                <a:rPr lang="de-DE" sz="2400" dirty="0"/>
+                <a:t>Ressourcenschonung Bildung für Kinder Unterstützung </a:t>
+              </a:r>
+            </a:p>
+            <a:p>
+              <a:pPr marL="518160" lvl="1" indent="-259080" algn="l">
+                <a:lnSpc>
+                  <a:spcPts val="4079"/>
+                </a:lnSpc>
+                <a:buFont typeface="Arial"/>
+                <a:buChar char="•"/>
+              </a:pPr>
+              <a:r>
+                <a:rPr lang="de-DE" sz="2400" dirty="0"/>
+                <a:t>Mentale Gesundheit-&gt; (Einrichtungen, Behindertenwerkstätten , Schulen)</a:t>
+              </a:r>
+              <a:endParaRPr lang="en-US" sz="2400" dirty="0">
                 <a:solidFill>
                   <a:srgbClr val="0A2803"/>
                 </a:solidFill>
@@ -6997,7 +7686,7 @@
           </p:nvSpPr>
           <p:spPr>
             <a:xfrm>
-              <a:off x="0" y="-66675"/>
+              <a:off x="147255" y="-1978078"/>
               <a:ext cx="6802515" cy="632248"/>
             </a:xfrm>
             <a:prstGeom prst="rect">
@@ -7010,7 +7699,7 @@
             </a:bodyPr>
             <a:lstStyle/>
             <a:p>
-              <a:pPr marL="0" lvl="0" indent="0" algn="l">
+              <a:pPr marL="0" lvl="0" indent="0" algn="ctr">
                 <a:lnSpc>
                   <a:spcPts val="3919"/>
                 </a:lnSpc>
@@ -7051,10 +7740,10 @@
         </p:nvGrpSpPr>
         <p:grpSpPr>
           <a:xfrm>
-            <a:off x="12157413" y="5670027"/>
-            <a:ext cx="5101887" cy="2954022"/>
-            <a:chOff x="0" y="0"/>
-            <a:chExt cx="6802515" cy="3938696"/>
+            <a:off x="12268872" y="3741800"/>
+            <a:ext cx="5101887" cy="4591116"/>
+            <a:chOff x="0" y="-66675"/>
+            <a:chExt cx="6802515" cy="6121486"/>
           </a:xfrm>
         </p:grpSpPr>
         <p:sp>
@@ -7065,8 +7754,8 @@
           </p:nvSpPr>
           <p:spPr>
             <a:xfrm>
-              <a:off x="194925" y="589071"/>
-              <a:ext cx="5995130" cy="3349625"/>
+              <a:off x="57895" y="515516"/>
+              <a:ext cx="5995130" cy="5539295"/>
             </a:xfrm>
             <a:prstGeom prst="rect">
               <a:avLst/>
@@ -7086,16 +7775,8 @@
                 <a:buChar char="•"/>
               </a:pPr>
               <a:r>
-                <a:rPr lang="en-US" sz="2400">
-                  <a:solidFill>
-                    <a:srgbClr val="0A2803"/>
-                  </a:solidFill>
-                  <a:latin typeface="Quicksand"/>
-                  <a:ea typeface="Quicksand"/>
-                  <a:cs typeface="Quicksand"/>
-                  <a:sym typeface="Quicksand"/>
-                </a:rPr>
-                <a:t>Description</a:t>
+                <a:rPr lang="de-DE" sz="2400" dirty="0"/>
+                <a:t>Komponenten das Produkt sind einfach zu beschaffen</a:t>
               </a:r>
             </a:p>
             <a:p>
@@ -7107,16 +7788,8 @@
                 <a:buChar char="•"/>
               </a:pPr>
               <a:r>
-                <a:rPr lang="en-US" sz="2400">
-                  <a:solidFill>
-                    <a:srgbClr val="0A2803"/>
-                  </a:solidFill>
-                  <a:latin typeface="Quicksand"/>
-                  <a:ea typeface="Quicksand"/>
-                  <a:cs typeface="Quicksand"/>
-                  <a:sym typeface="Quicksand"/>
-                </a:rPr>
-                <a:t>Description</a:t>
+                <a:rPr lang="de-DE" sz="2400" dirty="0"/>
+                <a:t>Rucksäcke -&gt; Kooperation ASZ Füllmaterial aus Altkleider -&gt; Kooperation ASZ, Volkshilfe,..</a:t>
               </a:r>
             </a:p>
             <a:p>
@@ -7128,16 +7801,8 @@
                 <a:buChar char="•"/>
               </a:pPr>
               <a:r>
-                <a:rPr lang="en-US" sz="2400">
-                  <a:solidFill>
-                    <a:srgbClr val="0A2803"/>
-                  </a:solidFill>
-                  <a:latin typeface="Quicksand"/>
-                  <a:ea typeface="Quicksand"/>
-                  <a:cs typeface="Quicksand"/>
-                  <a:sym typeface="Quicksand"/>
-                </a:rPr>
-                <a:t>Description</a:t>
+                <a:rPr lang="de-DE" sz="2400" dirty="0"/>
+                <a:t>Wasserleitung, Stromzufuhr</a:t>
               </a:r>
             </a:p>
             <a:p>
@@ -7149,25 +7814,10 @@
                 <a:buChar char="•"/>
               </a:pPr>
               <a:r>
-                <a:rPr lang="en-US" sz="2400">
-                  <a:solidFill>
-                    <a:srgbClr val="0A2803"/>
-                  </a:solidFill>
-                  <a:latin typeface="Quicksand"/>
-                  <a:ea typeface="Quicksand"/>
-                  <a:cs typeface="Quicksand"/>
-                  <a:sym typeface="Quicksand"/>
-                </a:rPr>
-                <a:t>Description</a:t>
+                <a:rPr lang="de-DE" sz="2400" dirty="0"/>
+                <a:t>Pflanzensamen --&gt; Kooperation mit Gärtnereibetriebe</a:t>
               </a:r>
-            </a:p>
-            <a:p>
-              <a:pPr algn="l">
-                <a:lnSpc>
-                  <a:spcPts val="4079"/>
-                </a:lnSpc>
-              </a:pPr>
-              <a:endParaRPr lang="en-US" sz="2400">
+              <a:endParaRPr lang="en-US" sz="2400" dirty="0">
                 <a:solidFill>
                   <a:srgbClr val="0A2803"/>
                 </a:solidFill>
@@ -7200,7 +7850,7 @@
             </a:bodyPr>
             <a:lstStyle/>
             <a:p>
-              <a:pPr marL="0" lvl="0" indent="0" algn="l">
+              <a:pPr marL="0" lvl="0" indent="0" algn="ctr">
                 <a:lnSpc>
                   <a:spcPts val="3919"/>
                 </a:lnSpc>
@@ -7337,7 +7987,7 @@
 </p:sld>
 </file>
 
-<file path=ppt/slides/slide6.xml><?xml version="1.0" encoding="utf-8"?>
+<file path=ppt/slides/slide7.xml><?xml version="1.0" encoding="utf-8"?>
 <p:sld xmlns:a="http://schemas.openxmlformats.org/drawingml/2006/main" xmlns:r="http://schemas.openxmlformats.org/officeDocument/2006/relationships" xmlns:p="http://schemas.openxmlformats.org/presentationml/2006/main">
   <p:cSld>
     <p:bg>
@@ -7627,8 +8277,8 @@
           <p:nvPr/>
         </p:nvSpPr>
         <p:spPr>
-          <a:xfrm rot="7586023">
-            <a:off x="16833242" y="9261896"/>
+          <a:xfrm rot="18293711">
+            <a:off x="206691" y="56350"/>
             <a:ext cx="852116" cy="835680"/>
           </a:xfrm>
           <a:custGeom>
@@ -7687,7 +8337,7 @@
 </p:sld>
 </file>
 
-<file path=ppt/slides/slide7.xml><?xml version="1.0" encoding="utf-8"?>
+<file path=ppt/slides/slide8.xml><?xml version="1.0" encoding="utf-8"?>
 <p:sld xmlns:a="http://schemas.openxmlformats.org/drawingml/2006/main" xmlns:r="http://schemas.openxmlformats.org/officeDocument/2006/relationships" xmlns:p="http://schemas.openxmlformats.org/presentationml/2006/main">
   <p:cSld>
     <p:spTree>

</xml_diff>

<commit_message>
added image source and layout adjustments
</commit_message>
<xml_diff>
--- a/praesentation/Plant2Go_Presentation_07112024.pptx
+++ b/praesentation/Plant2Go_Presentation_07112024.pptx
@@ -324,7 +324,7 @@
             <a:fld id="{1D8BD707-D9CF-40AE-B4C6-C98DA3205C09}" type="datetimeFigureOut">
               <a:rPr lang="en-US" smtClean="0"/>
               <a:pPr/>
-              <a:t>11/6/2024</a:t>
+              <a:t>11/7/2024</a:t>
             </a:fld>
             <a:endParaRPr lang="en-US"/>
           </a:p>
@@ -489,7 +489,7 @@
             <a:fld id="{1D8BD707-D9CF-40AE-B4C6-C98DA3205C09}" type="datetimeFigureOut">
               <a:rPr lang="en-US" smtClean="0"/>
               <a:pPr/>
-              <a:t>11/6/2024</a:t>
+              <a:t>11/7/2024</a:t>
             </a:fld>
             <a:endParaRPr lang="en-US"/>
           </a:p>
@@ -664,7 +664,7 @@
             <a:fld id="{1D8BD707-D9CF-40AE-B4C6-C98DA3205C09}" type="datetimeFigureOut">
               <a:rPr lang="en-US" smtClean="0"/>
               <a:pPr/>
-              <a:t>11/6/2024</a:t>
+              <a:t>11/7/2024</a:t>
             </a:fld>
             <a:endParaRPr lang="en-US"/>
           </a:p>
@@ -829,7 +829,7 @@
             <a:fld id="{1D8BD707-D9CF-40AE-B4C6-C98DA3205C09}" type="datetimeFigureOut">
               <a:rPr lang="en-US" smtClean="0"/>
               <a:pPr/>
-              <a:t>11/6/2024</a:t>
+              <a:t>11/7/2024</a:t>
             </a:fld>
             <a:endParaRPr lang="en-US"/>
           </a:p>
@@ -1071,7 +1071,7 @@
             <a:fld id="{1D8BD707-D9CF-40AE-B4C6-C98DA3205C09}" type="datetimeFigureOut">
               <a:rPr lang="en-US" smtClean="0"/>
               <a:pPr/>
-              <a:t>11/6/2024</a:t>
+              <a:t>11/7/2024</a:t>
             </a:fld>
             <a:endParaRPr lang="en-US"/>
           </a:p>
@@ -1353,7 +1353,7 @@
             <a:fld id="{1D8BD707-D9CF-40AE-B4C6-C98DA3205C09}" type="datetimeFigureOut">
               <a:rPr lang="en-US" smtClean="0"/>
               <a:pPr/>
-              <a:t>11/6/2024</a:t>
+              <a:t>11/7/2024</a:t>
             </a:fld>
             <a:endParaRPr lang="en-US"/>
           </a:p>
@@ -1769,7 +1769,7 @@
             <a:fld id="{1D8BD707-D9CF-40AE-B4C6-C98DA3205C09}" type="datetimeFigureOut">
               <a:rPr lang="en-US" smtClean="0"/>
               <a:pPr/>
-              <a:t>11/6/2024</a:t>
+              <a:t>11/7/2024</a:t>
             </a:fld>
             <a:endParaRPr lang="en-US"/>
           </a:p>
@@ -1883,7 +1883,7 @@
             <a:fld id="{1D8BD707-D9CF-40AE-B4C6-C98DA3205C09}" type="datetimeFigureOut">
               <a:rPr lang="en-US" smtClean="0"/>
               <a:pPr/>
-              <a:t>11/6/2024</a:t>
+              <a:t>11/7/2024</a:t>
             </a:fld>
             <a:endParaRPr lang="en-US"/>
           </a:p>
@@ -1975,7 +1975,7 @@
             <a:fld id="{1D8BD707-D9CF-40AE-B4C6-C98DA3205C09}" type="datetimeFigureOut">
               <a:rPr lang="en-US" smtClean="0"/>
               <a:pPr/>
-              <a:t>11/6/2024</a:t>
+              <a:t>11/7/2024</a:t>
             </a:fld>
             <a:endParaRPr lang="en-US"/>
           </a:p>
@@ -2247,7 +2247,7 @@
             <a:fld id="{1D8BD707-D9CF-40AE-B4C6-C98DA3205C09}" type="datetimeFigureOut">
               <a:rPr lang="en-US" smtClean="0"/>
               <a:pPr/>
-              <a:t>11/6/2024</a:t>
+              <a:t>11/7/2024</a:t>
             </a:fld>
             <a:endParaRPr lang="en-US"/>
           </a:p>
@@ -2496,7 +2496,7 @@
             <a:fld id="{1D8BD707-D9CF-40AE-B4C6-C98DA3205C09}" type="datetimeFigureOut">
               <a:rPr lang="en-US" smtClean="0"/>
               <a:pPr/>
-              <a:t>11/6/2024</a:t>
+              <a:t>11/7/2024</a:t>
             </a:fld>
             <a:endParaRPr lang="en-US"/>
           </a:p>
@@ -2704,7 +2704,7 @@
             <a:fld id="{1D8BD707-D9CF-40AE-B4C6-C98DA3205C09}" type="datetimeFigureOut">
               <a:rPr lang="en-US" smtClean="0"/>
               <a:pPr/>
-              <a:t>11/6/2024</a:t>
+              <a:t>11/7/2024</a:t>
             </a:fld>
             <a:endParaRPr lang="en-US"/>
           </a:p>
@@ -4851,6 +4851,41 @@
           </a:p>
         </p:txBody>
       </p:sp>
+      <p:sp>
+        <p:nvSpPr>
+          <p:cNvPr id="5" name="Textfeld 4">
+            <a:extLst>
+              <a:ext uri="{FF2B5EF4-FFF2-40B4-BE49-F238E27FC236}">
+                <a16:creationId xmlns:a16="http://schemas.microsoft.com/office/drawing/2014/main" id="{44AD7DD6-EF75-49E9-B2C5-EC3CB07D5765}"/>
+              </a:ext>
+            </a:extLst>
+          </p:cNvPr>
+          <p:cNvSpPr txBox="1"/>
+          <p:nvPr/>
+        </p:nvSpPr>
+        <p:spPr>
+          <a:xfrm>
+            <a:off x="9406650" y="9424980"/>
+            <a:ext cx="2218428" cy="338554"/>
+          </a:xfrm>
+          <a:prstGeom prst="rect">
+            <a:avLst/>
+          </a:prstGeom>
+          <a:noFill/>
+        </p:spPr>
+        <p:txBody>
+          <a:bodyPr wrap="none" rtlCol="0">
+            <a:spAutoFit/>
+          </a:bodyPr>
+          <a:lstStyle/>
+          <a:p>
+            <a:r>
+              <a:rPr lang="de-AT" sz="1600" dirty="0"/>
+              <a:t>Quelle: chat.openai.com</a:t>
+            </a:r>
+          </a:p>
+        </p:txBody>
+      </p:sp>
     </p:spTree>
   </p:cSld>
   <p:clrMapOvr>
@@ -6353,7 +6388,7 @@
                   <a:sysClr val="windowText" lastClr="000000"/>
                 </a:solidFill>
               </a:rPr>
-              <a:t>Der Plant2Go Rucksack ist ein innovativer , nachhaltiger Rucksack, der als mobile Pflanzenzuchtstation konzipiert wurde und es ermöglicht, Obst und Gemüse auf kleinstem Raum anzubauen. Durch Upcycling alter Rucksäcke und die Integration umweltfreundlicher Materialien bietet er eine multifunktionale Lösung für umweltbewusste Nutzer, die mobil oder in städtischen Umgebungen gärtnern möchten</a:t>
+              <a:t>Der Plant2Go Rucksack ist ein innovativer, nachhaltiger Rucksack, der als mobile Pflanzenzuchtstation konzipiert wurde und es ermöglicht, Obst und Gemüse auf kleinstem Raum anzubauen. Durch Upcycling alter Rucksäcke und die Integration umweltfreundlicher Materialien bietet er eine multifunktionale Lösung für umweltbewusste Nutzer, die mobil oder in städtischen Umgebungen gärtnern möchten</a:t>
             </a:r>
             <a:endParaRPr lang="de-AT" dirty="0">
               <a:solidFill>
@@ -6783,7 +6818,7 @@
         <p:grpSpPr>
           <a:xfrm>
             <a:off x="925818" y="677679"/>
-            <a:ext cx="5488948" cy="7890311"/>
+            <a:ext cx="5488948" cy="9136806"/>
             <a:chOff x="-27176" y="-123825"/>
             <a:chExt cx="1445649" cy="2183687"/>
           </a:xfrm>
@@ -7156,8 +7191,8 @@
         </p:nvGrpSpPr>
         <p:grpSpPr>
           <a:xfrm>
-            <a:off x="12015475" y="2456695"/>
-            <a:ext cx="5385764" cy="6426664"/>
+            <a:off x="12015475" y="2456694"/>
+            <a:ext cx="5385764" cy="7371221"/>
             <a:chOff x="0" y="0"/>
             <a:chExt cx="1418473" cy="1692619"/>
           </a:xfrm>
@@ -7448,7 +7483,15 @@
               </a:pPr>
               <a:r>
                 <a:rPr lang="de-AT" sz="2400" dirty="0"/>
-                <a:t>(wenig Ressourcen) Ortsunabhängig (indoor, Outdoor, mobil) </a:t>
+                <a:t>(wenig Ressourcen) Ortsunabhängig (indoor, </a:t>
+              </a:r>
+              <a:r>
+                <a:rPr lang="de-AT" sz="2400" dirty="0" err="1"/>
+                <a:t>outdoor</a:t>
+              </a:r>
+              <a:r>
+                <a:rPr lang="de-AT" sz="2400" dirty="0"/>
+                <a:t>, mobil) </a:t>
               </a:r>
             </a:p>
             <a:p>
@@ -7741,9 +7784,9 @@
         <p:grpSpPr>
           <a:xfrm>
             <a:off x="12268872" y="3741800"/>
-            <a:ext cx="5101887" cy="4591116"/>
+            <a:ext cx="5101887" cy="5116898"/>
             <a:chOff x="0" y="-66675"/>
-            <a:chExt cx="6802515" cy="6121486"/>
+            <a:chExt cx="6802515" cy="6822528"/>
           </a:xfrm>
         </p:grpSpPr>
         <p:sp>
@@ -7754,8 +7797,8 @@
           </p:nvSpPr>
           <p:spPr>
             <a:xfrm>
-              <a:off x="57895" y="515516"/>
-              <a:ext cx="5995130" cy="5539295"/>
+              <a:off x="57895" y="515515"/>
+              <a:ext cx="5995130" cy="6240338"/>
             </a:xfrm>
             <a:prstGeom prst="rect">
               <a:avLst/>
@@ -7776,7 +7819,7 @@
               </a:pPr>
               <a:r>
                 <a:rPr lang="de-DE" sz="2400" dirty="0"/>
-                <a:t>Komponenten das Produkt sind einfach zu beschaffen</a:t>
+                <a:t>Komponenten des Produkts sind einfach zu beschaffen</a:t>
               </a:r>
             </a:p>
             <a:p>
@@ -7789,7 +7832,46 @@
               </a:pPr>
               <a:r>
                 <a:rPr lang="de-DE" sz="2400" dirty="0"/>
-                <a:t>Rucksäcke -&gt; Kooperation ASZ Füllmaterial aus Altkleider -&gt; Kooperation ASZ, Volkshilfe,..</a:t>
+                <a:t>Rucksäcke  </a:t>
+              </a:r>
+            </a:p>
+            <a:p>
+              <a:pPr marL="975360" lvl="2" indent="-259080">
+                <a:lnSpc>
+                  <a:spcPts val="4079"/>
+                </a:lnSpc>
+                <a:buFont typeface="Arial"/>
+                <a:buChar char="•"/>
+              </a:pPr>
+              <a:r>
+                <a:rPr lang="de-DE" sz="2400" dirty="0"/>
+                <a:t>Kooperation </a:t>
+              </a:r>
+            </a:p>
+            <a:p>
+              <a:pPr marL="518160" lvl="1" indent="-259080" algn="l">
+                <a:lnSpc>
+                  <a:spcPts val="4079"/>
+                </a:lnSpc>
+                <a:buFont typeface="Arial"/>
+                <a:buChar char="•"/>
+              </a:pPr>
+              <a:r>
+                <a:rPr lang="de-DE" sz="2400" dirty="0"/>
+                <a:t>Füllmaterial aus Altkleider</a:t>
+              </a:r>
+            </a:p>
+            <a:p>
+              <a:pPr marL="518160" lvl="1" indent="-259080" algn="l">
+                <a:lnSpc>
+                  <a:spcPts val="4079"/>
+                </a:lnSpc>
+                <a:buFont typeface="Arial"/>
+                <a:buChar char="•"/>
+              </a:pPr>
+              <a:r>
+                <a:rPr lang="de-DE" sz="2400" dirty="0"/>
+                <a:t>Kooperation ASZ, Volkshilfe,..</a:t>
               </a:r>
             </a:p>
             <a:p>
@@ -7927,8 +8009,8 @@
           <p:nvPr/>
         </p:nvSpPr>
         <p:spPr>
-          <a:xfrm rot="8956240">
-            <a:off x="17065724" y="8810407"/>
+          <a:xfrm rot="2350315">
+            <a:off x="16962862" y="1374345"/>
             <a:ext cx="1247292" cy="1086198"/>
           </a:xfrm>
           <a:custGeom>

</xml_diff>

<commit_message>
Deploying to gh-pages from @ plant2go/design@98febbf9930cc9030f221e9c88729b557865b15d 🚀
</commit_message>
<xml_diff>
--- a/praesentation/Plant2Go_Presentation_07112024.pptx
+++ b/praesentation/Plant2Go_Presentation_07112024.pptx
@@ -324,7 +324,7 @@
             <a:fld id="{1D8BD707-D9CF-40AE-B4C6-C98DA3205C09}" type="datetimeFigureOut">
               <a:rPr lang="en-US" smtClean="0"/>
               <a:pPr/>
-              <a:t>11/6/2024</a:t>
+              <a:t>11/7/2024</a:t>
             </a:fld>
             <a:endParaRPr lang="en-US"/>
           </a:p>
@@ -489,7 +489,7 @@
             <a:fld id="{1D8BD707-D9CF-40AE-B4C6-C98DA3205C09}" type="datetimeFigureOut">
               <a:rPr lang="en-US" smtClean="0"/>
               <a:pPr/>
-              <a:t>11/6/2024</a:t>
+              <a:t>11/7/2024</a:t>
             </a:fld>
             <a:endParaRPr lang="en-US"/>
           </a:p>
@@ -664,7 +664,7 @@
             <a:fld id="{1D8BD707-D9CF-40AE-B4C6-C98DA3205C09}" type="datetimeFigureOut">
               <a:rPr lang="en-US" smtClean="0"/>
               <a:pPr/>
-              <a:t>11/6/2024</a:t>
+              <a:t>11/7/2024</a:t>
             </a:fld>
             <a:endParaRPr lang="en-US"/>
           </a:p>
@@ -829,7 +829,7 @@
             <a:fld id="{1D8BD707-D9CF-40AE-B4C6-C98DA3205C09}" type="datetimeFigureOut">
               <a:rPr lang="en-US" smtClean="0"/>
               <a:pPr/>
-              <a:t>11/6/2024</a:t>
+              <a:t>11/7/2024</a:t>
             </a:fld>
             <a:endParaRPr lang="en-US"/>
           </a:p>
@@ -1071,7 +1071,7 @@
             <a:fld id="{1D8BD707-D9CF-40AE-B4C6-C98DA3205C09}" type="datetimeFigureOut">
               <a:rPr lang="en-US" smtClean="0"/>
               <a:pPr/>
-              <a:t>11/6/2024</a:t>
+              <a:t>11/7/2024</a:t>
             </a:fld>
             <a:endParaRPr lang="en-US"/>
           </a:p>
@@ -1353,7 +1353,7 @@
             <a:fld id="{1D8BD707-D9CF-40AE-B4C6-C98DA3205C09}" type="datetimeFigureOut">
               <a:rPr lang="en-US" smtClean="0"/>
               <a:pPr/>
-              <a:t>11/6/2024</a:t>
+              <a:t>11/7/2024</a:t>
             </a:fld>
             <a:endParaRPr lang="en-US"/>
           </a:p>
@@ -1769,7 +1769,7 @@
             <a:fld id="{1D8BD707-D9CF-40AE-B4C6-C98DA3205C09}" type="datetimeFigureOut">
               <a:rPr lang="en-US" smtClean="0"/>
               <a:pPr/>
-              <a:t>11/6/2024</a:t>
+              <a:t>11/7/2024</a:t>
             </a:fld>
             <a:endParaRPr lang="en-US"/>
           </a:p>
@@ -1883,7 +1883,7 @@
             <a:fld id="{1D8BD707-D9CF-40AE-B4C6-C98DA3205C09}" type="datetimeFigureOut">
               <a:rPr lang="en-US" smtClean="0"/>
               <a:pPr/>
-              <a:t>11/6/2024</a:t>
+              <a:t>11/7/2024</a:t>
             </a:fld>
             <a:endParaRPr lang="en-US"/>
           </a:p>
@@ -1975,7 +1975,7 @@
             <a:fld id="{1D8BD707-D9CF-40AE-B4C6-C98DA3205C09}" type="datetimeFigureOut">
               <a:rPr lang="en-US" smtClean="0"/>
               <a:pPr/>
-              <a:t>11/6/2024</a:t>
+              <a:t>11/7/2024</a:t>
             </a:fld>
             <a:endParaRPr lang="en-US"/>
           </a:p>
@@ -2247,7 +2247,7 @@
             <a:fld id="{1D8BD707-D9CF-40AE-B4C6-C98DA3205C09}" type="datetimeFigureOut">
               <a:rPr lang="en-US" smtClean="0"/>
               <a:pPr/>
-              <a:t>11/6/2024</a:t>
+              <a:t>11/7/2024</a:t>
             </a:fld>
             <a:endParaRPr lang="en-US"/>
           </a:p>
@@ -2496,7 +2496,7 @@
             <a:fld id="{1D8BD707-D9CF-40AE-B4C6-C98DA3205C09}" type="datetimeFigureOut">
               <a:rPr lang="en-US" smtClean="0"/>
               <a:pPr/>
-              <a:t>11/6/2024</a:t>
+              <a:t>11/7/2024</a:t>
             </a:fld>
             <a:endParaRPr lang="en-US"/>
           </a:p>
@@ -2704,7 +2704,7 @@
             <a:fld id="{1D8BD707-D9CF-40AE-B4C6-C98DA3205C09}" type="datetimeFigureOut">
               <a:rPr lang="en-US" smtClean="0"/>
               <a:pPr/>
-              <a:t>11/6/2024</a:t>
+              <a:t>11/7/2024</a:t>
             </a:fld>
             <a:endParaRPr lang="en-US"/>
           </a:p>
@@ -4851,6 +4851,41 @@
           </a:p>
         </p:txBody>
       </p:sp>
+      <p:sp>
+        <p:nvSpPr>
+          <p:cNvPr id="5" name="Textfeld 4">
+            <a:extLst>
+              <a:ext uri="{FF2B5EF4-FFF2-40B4-BE49-F238E27FC236}">
+                <a16:creationId xmlns:a16="http://schemas.microsoft.com/office/drawing/2014/main" id="{44AD7DD6-EF75-49E9-B2C5-EC3CB07D5765}"/>
+              </a:ext>
+            </a:extLst>
+          </p:cNvPr>
+          <p:cNvSpPr txBox="1"/>
+          <p:nvPr/>
+        </p:nvSpPr>
+        <p:spPr>
+          <a:xfrm>
+            <a:off x="9406650" y="9424980"/>
+            <a:ext cx="2218428" cy="338554"/>
+          </a:xfrm>
+          <a:prstGeom prst="rect">
+            <a:avLst/>
+          </a:prstGeom>
+          <a:noFill/>
+        </p:spPr>
+        <p:txBody>
+          <a:bodyPr wrap="none" rtlCol="0">
+            <a:spAutoFit/>
+          </a:bodyPr>
+          <a:lstStyle/>
+          <a:p>
+            <a:r>
+              <a:rPr lang="de-AT" sz="1600" dirty="0"/>
+              <a:t>Quelle: chat.openai.com</a:t>
+            </a:r>
+          </a:p>
+        </p:txBody>
+      </p:sp>
     </p:spTree>
   </p:cSld>
   <p:clrMapOvr>
@@ -6353,7 +6388,7 @@
                   <a:sysClr val="windowText" lastClr="000000"/>
                 </a:solidFill>
               </a:rPr>
-              <a:t>Der Plant2Go Rucksack ist ein innovativer , nachhaltiger Rucksack, der als mobile Pflanzenzuchtstation konzipiert wurde und es ermöglicht, Obst und Gemüse auf kleinstem Raum anzubauen. Durch Upcycling alter Rucksäcke und die Integration umweltfreundlicher Materialien bietet er eine multifunktionale Lösung für umweltbewusste Nutzer, die mobil oder in städtischen Umgebungen gärtnern möchten</a:t>
+              <a:t>Der Plant2Go Rucksack ist ein innovativer, nachhaltiger Rucksack, der als mobile Pflanzenzuchtstation konzipiert wurde und es ermöglicht, Obst und Gemüse auf kleinstem Raum anzubauen. Durch Upcycling alter Rucksäcke und die Integration umweltfreundlicher Materialien bietet er eine multifunktionale Lösung für umweltbewusste Nutzer, die mobil oder in städtischen Umgebungen gärtnern möchten</a:t>
             </a:r>
             <a:endParaRPr lang="de-AT" dirty="0">
               <a:solidFill>
@@ -6783,7 +6818,7 @@
         <p:grpSpPr>
           <a:xfrm>
             <a:off x="925818" y="677679"/>
-            <a:ext cx="5488948" cy="7890311"/>
+            <a:ext cx="5488948" cy="9136806"/>
             <a:chOff x="-27176" y="-123825"/>
             <a:chExt cx="1445649" cy="2183687"/>
           </a:xfrm>
@@ -7156,8 +7191,8 @@
         </p:nvGrpSpPr>
         <p:grpSpPr>
           <a:xfrm>
-            <a:off x="12015475" y="2456695"/>
-            <a:ext cx="5385764" cy="6426664"/>
+            <a:off x="12015475" y="2456694"/>
+            <a:ext cx="5385764" cy="7371221"/>
             <a:chOff x="0" y="0"/>
             <a:chExt cx="1418473" cy="1692619"/>
           </a:xfrm>
@@ -7448,7 +7483,15 @@
               </a:pPr>
               <a:r>
                 <a:rPr lang="de-AT" sz="2400" dirty="0"/>
-                <a:t>(wenig Ressourcen) Ortsunabhängig (indoor, Outdoor, mobil) </a:t>
+                <a:t>(wenig Ressourcen) Ortsunabhängig (indoor, </a:t>
+              </a:r>
+              <a:r>
+                <a:rPr lang="de-AT" sz="2400" dirty="0" err="1"/>
+                <a:t>outdoor</a:t>
+              </a:r>
+              <a:r>
+                <a:rPr lang="de-AT" sz="2400" dirty="0"/>
+                <a:t>, mobil) </a:t>
               </a:r>
             </a:p>
             <a:p>
@@ -7741,9 +7784,9 @@
         <p:grpSpPr>
           <a:xfrm>
             <a:off x="12268872" y="3741800"/>
-            <a:ext cx="5101887" cy="4591116"/>
+            <a:ext cx="5101887" cy="5116898"/>
             <a:chOff x="0" y="-66675"/>
-            <a:chExt cx="6802515" cy="6121486"/>
+            <a:chExt cx="6802515" cy="6822528"/>
           </a:xfrm>
         </p:grpSpPr>
         <p:sp>
@@ -7754,8 +7797,8 @@
           </p:nvSpPr>
           <p:spPr>
             <a:xfrm>
-              <a:off x="57895" y="515516"/>
-              <a:ext cx="5995130" cy="5539295"/>
+              <a:off x="57895" y="515515"/>
+              <a:ext cx="5995130" cy="6240338"/>
             </a:xfrm>
             <a:prstGeom prst="rect">
               <a:avLst/>
@@ -7776,7 +7819,7 @@
               </a:pPr>
               <a:r>
                 <a:rPr lang="de-DE" sz="2400" dirty="0"/>
-                <a:t>Komponenten das Produkt sind einfach zu beschaffen</a:t>
+                <a:t>Komponenten des Produkts sind einfach zu beschaffen</a:t>
               </a:r>
             </a:p>
             <a:p>
@@ -7789,7 +7832,46 @@
               </a:pPr>
               <a:r>
                 <a:rPr lang="de-DE" sz="2400" dirty="0"/>
-                <a:t>Rucksäcke -&gt; Kooperation ASZ Füllmaterial aus Altkleider -&gt; Kooperation ASZ, Volkshilfe,..</a:t>
+                <a:t>Rucksäcke  </a:t>
+              </a:r>
+            </a:p>
+            <a:p>
+              <a:pPr marL="975360" lvl="2" indent="-259080">
+                <a:lnSpc>
+                  <a:spcPts val="4079"/>
+                </a:lnSpc>
+                <a:buFont typeface="Arial"/>
+                <a:buChar char="•"/>
+              </a:pPr>
+              <a:r>
+                <a:rPr lang="de-DE" sz="2400" dirty="0"/>
+                <a:t>Kooperation </a:t>
+              </a:r>
+            </a:p>
+            <a:p>
+              <a:pPr marL="518160" lvl="1" indent="-259080" algn="l">
+                <a:lnSpc>
+                  <a:spcPts val="4079"/>
+                </a:lnSpc>
+                <a:buFont typeface="Arial"/>
+                <a:buChar char="•"/>
+              </a:pPr>
+              <a:r>
+                <a:rPr lang="de-DE" sz="2400" dirty="0"/>
+                <a:t>Füllmaterial aus Altkleider</a:t>
+              </a:r>
+            </a:p>
+            <a:p>
+              <a:pPr marL="518160" lvl="1" indent="-259080" algn="l">
+                <a:lnSpc>
+                  <a:spcPts val="4079"/>
+                </a:lnSpc>
+                <a:buFont typeface="Arial"/>
+                <a:buChar char="•"/>
+              </a:pPr>
+              <a:r>
+                <a:rPr lang="de-DE" sz="2400" dirty="0"/>
+                <a:t>Kooperation ASZ, Volkshilfe,..</a:t>
               </a:r>
             </a:p>
             <a:p>
@@ -7927,8 +8009,8 @@
           <p:nvPr/>
         </p:nvSpPr>
         <p:spPr>
-          <a:xfrm rot="8956240">
-            <a:off x="17065724" y="8810407"/>
+          <a:xfrm rot="2350315">
+            <a:off x="16962862" y="1374345"/>
             <a:ext cx="1247292" cy="1086198"/>
           </a:xfrm>
           <a:custGeom>

</xml_diff>

<commit_message>
Deploying to gh-pages from @ plant2go/design@57aedbd11298b986f9fb004302d4b80d76bc8fd7 🚀
</commit_message>
<xml_diff>
--- a/praesentation/Plant2Go_Presentation_07112024.pptx
+++ b/praesentation/Plant2Go_Presentation_07112024.pptx
@@ -3302,9 +3302,9 @@
         <p:grpSpPr>
           <a:xfrm>
             <a:off x="1381016" y="2794962"/>
-            <a:ext cx="15525968" cy="5319627"/>
+            <a:ext cx="15525968" cy="5946206"/>
             <a:chOff x="0" y="618044"/>
-            <a:chExt cx="20701291" cy="7092835"/>
+            <a:chExt cx="20701291" cy="7928273"/>
           </a:xfrm>
         </p:grpSpPr>
         <p:sp>
@@ -3427,15 +3427,15 @@
           </p:nvSpPr>
           <p:spPr>
             <a:xfrm>
-              <a:off x="1829704" y="5410506"/>
-              <a:ext cx="16296070" cy="2300373"/>
+              <a:off x="425172" y="7451658"/>
+              <a:ext cx="19850947" cy="1094659"/>
             </a:xfrm>
             <a:prstGeom prst="rect">
               <a:avLst/>
             </a:prstGeom>
           </p:spPr>
           <p:txBody>
-            <a:bodyPr lIns="0" tIns="0" rIns="0" bIns="0" rtlCol="0" anchor="t">
+            <a:bodyPr wrap="square" lIns="0" tIns="0" rIns="0" bIns="0" rtlCol="0" anchor="t">
               <a:spAutoFit/>
             </a:bodyPr>
             <a:lstStyle/>
@@ -3449,7 +3449,7 @@
                 </a:spcBef>
               </a:pPr>
               <a:r>
-                <a:rPr lang="en-US" sz="5013" b="1" dirty="0">
+                <a:rPr lang="en-US" sz="4800" b="1" dirty="0">
                   <a:solidFill>
                     <a:srgbClr val="129A34"/>
                   </a:solidFill>
@@ -3458,20 +3458,10 @@
                   <a:cs typeface="Quicksand Bold"/>
                   <a:sym typeface="Quicksand Bold"/>
                 </a:rPr>
-                <a:t> Service Flip</a:t>
+                <a:t>Lydia R./Lena W./</a:t>
               </a:r>
-            </a:p>
-            <a:p>
-              <a:pPr marL="0" lvl="0" indent="0" algn="r">
-                <a:lnSpc>
-                  <a:spcPts val="7018"/>
-                </a:lnSpc>
-                <a:spcBef>
-                  <a:spcPct val="0"/>
-                </a:spcBef>
-              </a:pPr>
               <a:r>
-                <a:rPr lang="en-US" sz="5013" b="1" dirty="0">
+                <a:rPr lang="en-US" sz="4800" b="1" dirty="0" err="1">
                   <a:solidFill>
                     <a:srgbClr val="129A34"/>
                   </a:solidFill>
@@ -3480,7 +3470,19 @@
                   <a:cs typeface="Quicksand Bold"/>
                   <a:sym typeface="Quicksand Bold"/>
                 </a:rPr>
-                <a:t>Assumption Matrix</a:t>
+                <a:t>Wenxi</a:t>
+              </a:r>
+              <a:r>
+                <a:rPr lang="en-US" sz="4800" b="1" dirty="0">
+                  <a:solidFill>
+                    <a:srgbClr val="129A34"/>
+                  </a:solidFill>
+                  <a:latin typeface="Quicksand Bold"/>
+                  <a:ea typeface="Quicksand Bold"/>
+                  <a:cs typeface="Quicksand Bold"/>
+                  <a:sym typeface="Quicksand Bold"/>
+                </a:rPr>
+                <a:t> Y./Yaminia G.P./Julia K.</a:t>
               </a:r>
             </a:p>
           </p:txBody>

</xml_diff>